<commit_message>
updating the result section
</commit_message>
<xml_diff>
--- a/Awerbuch-Shiloach.pptx
+++ b/Awerbuch-Shiloach.pptx
@@ -2458,7 +2458,7 @@
           <a:p>
             <a:fld id="{C622430E-C94F-0443-A74B-4923D2640FEF}" type="datetimeFigureOut">
               <a:rPr lang="en-US" smtClean="0"/>
-              <a:t>4/23/18</a:t>
+              <a:t>4/29/18</a:t>
             </a:fld>
             <a:endParaRPr lang="en-US"/>
           </a:p>
@@ -3830,7 +3830,7 @@
           <a:p>
             <a:fld id="{70E671E0-AC50-434C-99FF-8DE52D2ADE56}" type="datetimeFigureOut">
               <a:rPr lang="en-US" smtClean="0"/>
-              <a:t>4/23/18</a:t>
+              <a:t>4/29/18</a:t>
             </a:fld>
             <a:endParaRPr lang="en-US"/>
           </a:p>
@@ -3998,7 +3998,7 @@
           <a:p>
             <a:fld id="{70E671E0-AC50-434C-99FF-8DE52D2ADE56}" type="datetimeFigureOut">
               <a:rPr lang="en-US" smtClean="0"/>
-              <a:t>4/23/18</a:t>
+              <a:t>4/29/18</a:t>
             </a:fld>
             <a:endParaRPr lang="en-US"/>
           </a:p>
@@ -4176,7 +4176,7 @@
           <a:p>
             <a:fld id="{70E671E0-AC50-434C-99FF-8DE52D2ADE56}" type="datetimeFigureOut">
               <a:rPr lang="en-US" smtClean="0"/>
-              <a:t>4/23/18</a:t>
+              <a:t>4/29/18</a:t>
             </a:fld>
             <a:endParaRPr lang="en-US"/>
           </a:p>
@@ -4344,7 +4344,7 @@
           <a:p>
             <a:fld id="{70E671E0-AC50-434C-99FF-8DE52D2ADE56}" type="datetimeFigureOut">
               <a:rPr lang="en-US" smtClean="0"/>
-              <a:t>4/23/18</a:t>
+              <a:t>4/29/18</a:t>
             </a:fld>
             <a:endParaRPr lang="en-US"/>
           </a:p>
@@ -4589,7 +4589,7 @@
           <a:p>
             <a:fld id="{70E671E0-AC50-434C-99FF-8DE52D2ADE56}" type="datetimeFigureOut">
               <a:rPr lang="en-US" smtClean="0"/>
-              <a:t>4/23/18</a:t>
+              <a:t>4/29/18</a:t>
             </a:fld>
             <a:endParaRPr lang="en-US"/>
           </a:p>
@@ -4874,7 +4874,7 @@
           <a:p>
             <a:fld id="{70E671E0-AC50-434C-99FF-8DE52D2ADE56}" type="datetimeFigureOut">
               <a:rPr lang="en-US" smtClean="0"/>
-              <a:t>4/23/18</a:t>
+              <a:t>4/29/18</a:t>
             </a:fld>
             <a:endParaRPr lang="en-US"/>
           </a:p>
@@ -5293,7 +5293,7 @@
           <a:p>
             <a:fld id="{70E671E0-AC50-434C-99FF-8DE52D2ADE56}" type="datetimeFigureOut">
               <a:rPr lang="en-US" smtClean="0"/>
-              <a:t>4/23/18</a:t>
+              <a:t>4/29/18</a:t>
             </a:fld>
             <a:endParaRPr lang="en-US"/>
           </a:p>
@@ -5410,7 +5410,7 @@
           <a:p>
             <a:fld id="{70E671E0-AC50-434C-99FF-8DE52D2ADE56}" type="datetimeFigureOut">
               <a:rPr lang="en-US" smtClean="0"/>
-              <a:t>4/23/18</a:t>
+              <a:t>4/29/18</a:t>
             </a:fld>
             <a:endParaRPr lang="en-US"/>
           </a:p>
@@ -5505,7 +5505,7 @@
           <a:p>
             <a:fld id="{70E671E0-AC50-434C-99FF-8DE52D2ADE56}" type="datetimeFigureOut">
               <a:rPr lang="en-US" smtClean="0"/>
-              <a:t>4/23/18</a:t>
+              <a:t>4/29/18</a:t>
             </a:fld>
             <a:endParaRPr lang="en-US"/>
           </a:p>
@@ -5780,7 +5780,7 @@
           <a:p>
             <a:fld id="{70E671E0-AC50-434C-99FF-8DE52D2ADE56}" type="datetimeFigureOut">
               <a:rPr lang="en-US" smtClean="0"/>
-              <a:t>4/23/18</a:t>
+              <a:t>4/29/18</a:t>
             </a:fld>
             <a:endParaRPr lang="en-US"/>
           </a:p>
@@ -6032,7 +6032,7 @@
           <a:p>
             <a:fld id="{70E671E0-AC50-434C-99FF-8DE52D2ADE56}" type="datetimeFigureOut">
               <a:rPr lang="en-US" smtClean="0"/>
-              <a:t>4/23/18</a:t>
+              <a:t>4/29/18</a:t>
             </a:fld>
             <a:endParaRPr lang="en-US"/>
           </a:p>
@@ -6243,7 +6243,7 @@
           <a:p>
             <a:fld id="{70E671E0-AC50-434C-99FF-8DE52D2ADE56}" type="datetimeFigureOut">
               <a:rPr lang="en-US" smtClean="0"/>
-              <a:t>4/23/18</a:t>
+              <a:t>4/29/18</a:t>
             </a:fld>
             <a:endParaRPr lang="en-US"/>
           </a:p>
@@ -26467,7 +26467,7 @@
               <a:rPr lang="en-US" sz="2000" spc="-150" dirty="0">
                 <a:latin typeface="Courier" pitchFamily="2" charset="0"/>
               </a:rPr>
-              <a:t>F[v] != GF[v] </a:t>
+              <a:t>f[v] != gf[v] </a:t>
             </a:r>
           </a:p>
           <a:p>
@@ -26498,7 +26498,7 @@
               <a:rPr lang="en-US" sz="2000" spc="-150" dirty="0">
                 <a:latin typeface="Courier" pitchFamily="2" charset="0"/>
               </a:rPr>
-              <a:t>[GF[v]] = </a:t>
+              <a:t>[gf[v]] = </a:t>
             </a:r>
             <a:r>
               <a:rPr lang="en-US" sz="2000" i="1" spc="-150" dirty="0">
@@ -26584,7 +26584,7 @@
               <a:rPr lang="en-US" sz="2000" spc="-150" dirty="0">
                 <a:latin typeface="Courier" pitchFamily="2" charset="0"/>
               </a:rPr>
-              <a:t> star[v] = star[F[v]]</a:t>
+              <a:t> star[v] = star[f[v]]</a:t>
             </a:r>
           </a:p>
           <a:p>

</xml_diff>